<commit_message>
Analisis de la demanda terminado
</commit_message>
<xml_diff>
--- a/analisisDeLaDemanda/source/vehiculosPorAno.pptx
+++ b/analisisDeLaDemanda/source/vehiculosPorAno.pptx
@@ -104,6 +104,11 @@
       </a:defRPr>
     </a:lvl9pPr>
   </p:defaultTextStyle>
+  <p:extLst>
+    <p:ext uri="{EFAFB233-063F-42B5-8137-9DF3F51BA10A}">
+      <p15:sldGuideLst xmlns:p15="http://schemas.microsoft.com/office/powerpoint/2012/main"/>
+    </p:ext>
+  </p:extLst>
 </p:presentation>
 </file>
 
@@ -128,10 +133,10 @@
           <c:layoutTarget val="inner"/>
           <c:xMode val="edge"/>
           <c:yMode val="edge"/>
-          <c:x val="0.12624663713910761"/>
-          <c:y val="2.0370370370370372E-2"/>
-          <c:w val="0.8622950295275591"/>
-          <c:h val="0.70717322834645668"/>
+          <c:x val="0.26159000860736986"/>
+          <c:y val="4.5058891035215924E-2"/>
+          <c:w val="0.71668159295135114"/>
+          <c:h val="0.59943919510061239"/>
         </c:manualLayout>
       </c:layout>
       <c:barChart>
@@ -143,7 +148,7 @@
           <c:order val="0"/>
           <c:tx>
             <c:strRef>
-              <c:f>'C:\Users\Miguel Resendiz\OneDrive\Documents\ESCOM\Viejo\Referencias\[tabas.xlsx]Hoja2'!$B$14</c:f>
+              <c:f>'Vehiculos por año'!$C$14</c:f>
               <c:strCache>
                 <c:ptCount val="1"/>
                 <c:pt idx="0">
@@ -192,7 +197,7 @@
           <c:invertIfNegative val="0"/>
           <c:cat>
             <c:numRef>
-              <c:f>[1]Hoja2!$A$15:$A$25</c:f>
+              <c:f>'Vehiculos por año'!$B$15:$B$25</c:f>
               <c:numCache>
                 <c:formatCode>General</c:formatCode>
                 <c:ptCount val="11"/>
@@ -234,9 +239,9 @@
           </c:cat>
           <c:val>
             <c:numRef>
-              <c:f>[1]Hoja2!$B$15:$B$25</c:f>
+              <c:f>'Vehiculos por año'!$C$15:$C$25</c:f>
               <c:numCache>
-                <c:formatCode>General</c:formatCode>
+                <c:formatCode>0.0</c:formatCode>
                 <c:ptCount val="11"/>
                 <c:pt idx="0">
                   <c:v>127.42049</c:v>
@@ -280,7 +285,7 @@
           <c:order val="1"/>
           <c:tx>
             <c:strRef>
-              <c:f>'C:\Users\Miguel Resendiz\OneDrive\Documents\ESCOM\Viejo\Referencias\[tabas.xlsx]Hoja2'!$C$14</c:f>
+              <c:f>'Vehiculos por año'!$D$14</c:f>
               <c:strCache>
                 <c:ptCount val="1"/>
                 <c:pt idx="0">
@@ -329,7 +334,7 @@
           <c:invertIfNegative val="0"/>
           <c:cat>
             <c:numRef>
-              <c:f>[1]Hoja2!$A$15:$A$25</c:f>
+              <c:f>'Vehiculos por año'!$B$15:$B$25</c:f>
               <c:numCache>
                 <c:formatCode>General</c:formatCode>
                 <c:ptCount val="11"/>
@@ -371,9 +376,9 @@
           </c:cat>
           <c:val>
             <c:numRef>
-              <c:f>[1]Hoja2!$C$15:$C$25</c:f>
+              <c:f>'Vehiculos por año'!$D$15:$D$25</c:f>
               <c:numCache>
-                <c:formatCode>General</c:formatCode>
+                <c:formatCode>0.0</c:formatCode>
                 <c:ptCount val="11"/>
                 <c:pt idx="0">
                   <c:v>63.172930000000001</c:v>
@@ -417,7 +422,7 @@
           <c:order val="2"/>
           <c:tx>
             <c:strRef>
-              <c:f>'C:\Users\Miguel Resendiz\OneDrive\Documents\ESCOM\Viejo\Referencias\[tabas.xlsx]Hoja2'!$D$14</c:f>
+              <c:f>'Vehiculos por año'!$E$14</c:f>
               <c:strCache>
                 <c:ptCount val="1"/>
                 <c:pt idx="0">
@@ -466,7 +471,7 @@
           <c:invertIfNegative val="0"/>
           <c:cat>
             <c:numRef>
-              <c:f>[1]Hoja2!$A$15:$A$25</c:f>
+              <c:f>'Vehiculos por año'!$B$15:$B$25</c:f>
               <c:numCache>
                 <c:formatCode>General</c:formatCode>
                 <c:ptCount val="11"/>
@@ -508,9 +513,9 @@
           </c:cat>
           <c:val>
             <c:numRef>
-              <c:f>[1]Hoja2!$D$15:$D$25</c:f>
+              <c:f>'Vehiculos por año'!$E$15:$E$25</c:f>
               <c:numCache>
-                <c:formatCode>General</c:formatCode>
+                <c:formatCode>0.0</c:formatCode>
                 <c:ptCount val="11"/>
                 <c:pt idx="0">
                   <c:v>4.3951700000000002</c:v>
@@ -554,7 +559,7 @@
           <c:order val="3"/>
           <c:tx>
             <c:strRef>
-              <c:f>'C:\Users\Miguel Resendiz\OneDrive\Documents\ESCOM\Viejo\Referencias\[tabas.xlsx]Hoja2'!$E$14</c:f>
+              <c:f>'Vehiculos por año'!$F$14</c:f>
               <c:strCache>
                 <c:ptCount val="1"/>
                 <c:pt idx="0">
@@ -607,7 +612,7 @@
           <c:invertIfNegative val="0"/>
           <c:cat>
             <c:numRef>
-              <c:f>[1]Hoja2!$A$15:$A$25</c:f>
+              <c:f>'Vehiculos por año'!$B$15:$B$25</c:f>
               <c:numCache>
                 <c:formatCode>General</c:formatCode>
                 <c:ptCount val="11"/>
@@ -649,9 +654,9 @@
           </c:cat>
           <c:val>
             <c:numRef>
-              <c:f>[1]Hoja2!$E$15:$E$25</c:f>
+              <c:f>'Vehiculos por año'!$F$15:$F$25</c:f>
               <c:numCache>
-                <c:formatCode>General</c:formatCode>
+                <c:formatCode>0.0</c:formatCode>
                 <c:ptCount val="11"/>
                 <c:pt idx="0">
                   <c:v>3.08101</c:v>
@@ -700,11 +705,11 @@
         </c:dLbls>
         <c:gapWidth val="150"/>
         <c:overlap val="100"/>
-        <c:axId val="372796360"/>
-        <c:axId val="372796752"/>
+        <c:axId val="450944424"/>
+        <c:axId val="450943640"/>
       </c:barChart>
       <c:catAx>
-        <c:axId val="372796360"/>
+        <c:axId val="450944424"/>
         <c:scaling>
           <c:orientation val="minMax"/>
         </c:scaling>
@@ -717,7 +722,7 @@
               <a:lstStyle/>
               <a:p>
                 <a:pPr>
-                  <a:defRPr sz="900" b="0" i="0" u="none" strike="noStrike" kern="1200" cap="all" baseline="0">
+                  <a:defRPr sz="2000" b="0" i="0" u="none" strike="noStrike" kern="1200" cap="all" baseline="0">
                     <a:solidFill>
                       <a:schemeClr val="tx1">
                         <a:lumMod val="50000"/>
@@ -756,7 +761,7 @@
             <a:lstStyle/>
             <a:p>
               <a:pPr>
-                <a:defRPr sz="900" b="0" i="0" u="none" strike="noStrike" kern="1200" cap="all" baseline="0">
+                <a:defRPr sz="2000" b="0" i="0" u="none" strike="noStrike" kern="1200" cap="all" baseline="0">
                   <a:solidFill>
                     <a:schemeClr val="tx1">
                       <a:lumMod val="50000"/>
@@ -794,7 +799,7 @@
           <a:lstStyle/>
           <a:p>
             <a:pPr>
-              <a:defRPr sz="900" b="0" i="0" u="none" strike="noStrike" kern="1200" baseline="0">
+              <a:defRPr sz="2000" b="0" i="0" u="none" strike="noStrike" kern="1200" baseline="0">
                 <a:solidFill>
                   <a:schemeClr val="tx1">
                     <a:lumMod val="50000"/>
@@ -809,7 +814,7 @@
             <a:endParaRPr lang="en-US"/>
           </a:p>
         </c:txPr>
-        <c:crossAx val="372796752"/>
+        <c:crossAx val="450943640"/>
         <c:crosses val="autoZero"/>
         <c:auto val="1"/>
         <c:lblAlgn val="ctr"/>
@@ -817,7 +822,7 @@
         <c:noMultiLvlLbl val="0"/>
       </c:catAx>
       <c:valAx>
-        <c:axId val="372796752"/>
+        <c:axId val="450943640"/>
         <c:scaling>
           <c:orientation val="minMax"/>
         </c:scaling>
@@ -844,7 +849,7 @@
               <a:lstStyle/>
               <a:p>
                 <a:pPr>
-                  <a:defRPr sz="1800" b="0" i="0" u="none" strike="noStrike" kern="1200" cap="all" baseline="0">
+                  <a:defRPr sz="2000" b="0" i="0" u="none" strike="noStrike" kern="1200" cap="all" baseline="0">
                     <a:solidFill>
                       <a:schemeClr val="tx1">
                         <a:lumMod val="50000"/>
@@ -857,7 +862,7 @@
                   </a:defRPr>
                 </a:pPr>
                 <a:r>
-                  <a:rPr lang="es-MX" sz="1800"/>
+                  <a:rPr lang="es-MX"/>
                   <a:t># de vechículos</a:t>
                 </a:r>
               </a:p>
@@ -877,7 +882,7 @@
             <a:lstStyle/>
             <a:p>
               <a:pPr>
-                <a:defRPr sz="1800" b="0" i="0" u="none" strike="noStrike" kern="1200" cap="all" baseline="0">
+                <a:defRPr sz="2000" b="0" i="0" u="none" strike="noStrike" kern="1200" cap="all" baseline="0">
                   <a:solidFill>
                     <a:schemeClr val="tx1">
                       <a:lumMod val="50000"/>
@@ -893,7 +898,7 @@
             </a:p>
           </c:txPr>
         </c:title>
-        <c:numFmt formatCode="General" sourceLinked="1"/>
+        <c:numFmt formatCode="0.0" sourceLinked="1"/>
         <c:majorTickMark val="none"/>
         <c:minorTickMark val="none"/>
         <c:tickLblPos val="nextTo"/>
@@ -909,7 +914,7 @@
           <a:lstStyle/>
           <a:p>
             <a:pPr>
-              <a:defRPr sz="1600" b="0" i="0" u="none" strike="noStrike" kern="1200" baseline="0">
+              <a:defRPr sz="2000" b="0" i="0" u="none" strike="noStrike" kern="1200" baseline="0">
                 <a:solidFill>
                   <a:schemeClr val="tx1">
                     <a:lumMod val="50000"/>
@@ -924,7 +929,7 @@
             <a:endParaRPr lang="en-US"/>
           </a:p>
         </c:txPr>
-        <c:crossAx val="372796360"/>
+        <c:crossAx val="450944424"/>
         <c:crossesAt val="1"/>
         <c:crossBetween val="between"/>
       </c:valAx>
@@ -950,7 +955,7 @@
           <a:lstStyle/>
           <a:p>
             <a:pPr rtl="0">
-              <a:defRPr sz="1400" b="0" i="0" u="none" strike="noStrike" kern="1200" baseline="0">
+              <a:defRPr sz="1800" b="0" i="0" u="none" strike="noStrike" kern="1200" baseline="0">
                 <a:solidFill>
                   <a:schemeClr val="tx1">
                     <a:lumMod val="50000"/>
@@ -974,6 +979,47 @@
         <a:effectLst/>
       </c:spPr>
     </c:plotArea>
+    <c:legend>
+      <c:legendPos val="b"/>
+      <c:layout>
+        <c:manualLayout>
+          <c:xMode val="edge"/>
+          <c:yMode val="edge"/>
+          <c:x val="0.14081417568802188"/>
+          <c:y val="0.92712774938220432"/>
+          <c:w val="0.71837164862395619"/>
+          <c:h val="7.2872250617795578E-2"/>
+        </c:manualLayout>
+      </c:layout>
+      <c:overlay val="0"/>
+      <c:spPr>
+        <a:noFill/>
+        <a:ln>
+          <a:noFill/>
+        </a:ln>
+        <a:effectLst/>
+      </c:spPr>
+      <c:txPr>
+        <a:bodyPr rot="0" spcFirstLastPara="1" vertOverflow="ellipsis" vert="horz" wrap="square" anchor="ctr" anchorCtr="1"/>
+        <a:lstStyle/>
+        <a:p>
+          <a:pPr>
+            <a:defRPr sz="2000" b="0" i="0" u="none" strike="noStrike" kern="1200" baseline="0">
+              <a:solidFill>
+                <a:schemeClr val="tx1">
+                  <a:lumMod val="50000"/>
+                  <a:lumOff val="50000"/>
+                </a:schemeClr>
+              </a:solidFill>
+              <a:latin typeface="+mn-lt"/>
+              <a:ea typeface="+mn-ea"/>
+              <a:cs typeface="+mn-cs"/>
+            </a:defRPr>
+          </a:pPr>
+          <a:endParaRPr lang="en-US"/>
+        </a:p>
+      </c:txPr>
+    </c:legend>
     <c:plotVisOnly val="1"/>
     <c:dispBlanksAs val="gap"/>
     <c:showDLblsOverMax val="0"/>
@@ -990,7 +1036,7 @@
     <a:lstStyle/>
     <a:p>
       <a:pPr>
-        <a:defRPr/>
+        <a:defRPr sz="2000"/>
       </a:pPr>
       <a:endParaRPr lang="en-US"/>
     </a:p>
@@ -1694,7 +1740,7 @@
           <a:p>
             <a:fld id="{8169D08C-28B2-4CA6-809B-0B11F14F9E8C}" type="datetimeFigureOut">
               <a:rPr lang="es-MX" smtClean="0"/>
-              <a:t>22/12/2014</a:t>
+              <a:t>30/12/2014</a:t>
             </a:fld>
             <a:endParaRPr lang="es-MX"/>
           </a:p>
@@ -1864,7 +1910,7 @@
           <a:p>
             <a:fld id="{8169D08C-28B2-4CA6-809B-0B11F14F9E8C}" type="datetimeFigureOut">
               <a:rPr lang="es-MX" smtClean="0"/>
-              <a:t>22/12/2014</a:t>
+              <a:t>30/12/2014</a:t>
             </a:fld>
             <a:endParaRPr lang="es-MX"/>
           </a:p>
@@ -2044,7 +2090,7 @@
           <a:p>
             <a:fld id="{8169D08C-28B2-4CA6-809B-0B11F14F9E8C}" type="datetimeFigureOut">
               <a:rPr lang="es-MX" smtClean="0"/>
-              <a:t>22/12/2014</a:t>
+              <a:t>30/12/2014</a:t>
             </a:fld>
             <a:endParaRPr lang="es-MX"/>
           </a:p>
@@ -2214,7 +2260,7 @@
           <a:p>
             <a:fld id="{8169D08C-28B2-4CA6-809B-0B11F14F9E8C}" type="datetimeFigureOut">
               <a:rPr lang="es-MX" smtClean="0"/>
-              <a:t>22/12/2014</a:t>
+              <a:t>30/12/2014</a:t>
             </a:fld>
             <a:endParaRPr lang="es-MX"/>
           </a:p>
@@ -2460,7 +2506,7 @@
           <a:p>
             <a:fld id="{8169D08C-28B2-4CA6-809B-0B11F14F9E8C}" type="datetimeFigureOut">
               <a:rPr lang="es-MX" smtClean="0"/>
-              <a:t>22/12/2014</a:t>
+              <a:t>30/12/2014</a:t>
             </a:fld>
             <a:endParaRPr lang="es-MX"/>
           </a:p>
@@ -2692,7 +2738,7 @@
           <a:p>
             <a:fld id="{8169D08C-28B2-4CA6-809B-0B11F14F9E8C}" type="datetimeFigureOut">
               <a:rPr lang="es-MX" smtClean="0"/>
-              <a:t>22/12/2014</a:t>
+              <a:t>30/12/2014</a:t>
             </a:fld>
             <a:endParaRPr lang="es-MX"/>
           </a:p>
@@ -3059,7 +3105,7 @@
           <a:p>
             <a:fld id="{8169D08C-28B2-4CA6-809B-0B11F14F9E8C}" type="datetimeFigureOut">
               <a:rPr lang="es-MX" smtClean="0"/>
-              <a:t>22/12/2014</a:t>
+              <a:t>30/12/2014</a:t>
             </a:fld>
             <a:endParaRPr lang="es-MX"/>
           </a:p>
@@ -3177,7 +3223,7 @@
           <a:p>
             <a:fld id="{8169D08C-28B2-4CA6-809B-0B11F14F9E8C}" type="datetimeFigureOut">
               <a:rPr lang="es-MX" smtClean="0"/>
-              <a:t>22/12/2014</a:t>
+              <a:t>30/12/2014</a:t>
             </a:fld>
             <a:endParaRPr lang="es-MX"/>
           </a:p>
@@ -3272,7 +3318,7 @@
           <a:p>
             <a:fld id="{8169D08C-28B2-4CA6-809B-0B11F14F9E8C}" type="datetimeFigureOut">
               <a:rPr lang="es-MX" smtClean="0"/>
-              <a:t>22/12/2014</a:t>
+              <a:t>30/12/2014</a:t>
             </a:fld>
             <a:endParaRPr lang="es-MX"/>
           </a:p>
@@ -3549,7 +3595,7 @@
           <a:p>
             <a:fld id="{8169D08C-28B2-4CA6-809B-0B11F14F9E8C}" type="datetimeFigureOut">
               <a:rPr lang="es-MX" smtClean="0"/>
-              <a:t>22/12/2014</a:t>
+              <a:t>30/12/2014</a:t>
             </a:fld>
             <a:endParaRPr lang="es-MX"/>
           </a:p>
@@ -3802,7 +3848,7 @@
           <a:p>
             <a:fld id="{8169D08C-28B2-4CA6-809B-0B11F14F9E8C}" type="datetimeFigureOut">
               <a:rPr lang="es-MX" smtClean="0"/>
-              <a:t>22/12/2014</a:t>
+              <a:t>30/12/2014</a:t>
             </a:fld>
             <a:endParaRPr lang="es-MX"/>
           </a:p>
@@ -4015,7 +4061,7 @@
           <a:p>
             <a:fld id="{8169D08C-28B2-4CA6-809B-0B11F14F9E8C}" type="datetimeFigureOut">
               <a:rPr lang="es-MX" smtClean="0"/>
-              <a:t>22/12/2014</a:t>
+              <a:t>30/12/2014</a:t>
             </a:fld>
             <a:endParaRPr lang="es-MX"/>
           </a:p>
@@ -4422,21 +4468,21 @@
       </p:grpSpPr>
       <p:graphicFrame>
         <p:nvGraphicFramePr>
-          <p:cNvPr id="4" name="Gráfico 3"/>
+          <p:cNvPr id="3" name="Gráfico 2"/>
           <p:cNvGraphicFramePr>
             <a:graphicFrameLocks/>
           </p:cNvGraphicFramePr>
           <p:nvPr>
             <p:extLst>
               <p:ext uri="{D42A27DB-BD31-4B8C-83A1-F6EECF244321}">
-                <p14:modId xmlns:p14="http://schemas.microsoft.com/office/powerpoint/2010/main" val="1740188377"/>
+                <p14:modId xmlns:p14="http://schemas.microsoft.com/office/powerpoint/2010/main" val="2641271787"/>
               </p:ext>
             </p:extLst>
           </p:nvPr>
         </p:nvGraphicFramePr>
         <p:xfrm>
           <a:off x="0" y="0"/>
-          <a:ext cx="12192000" cy="6858000"/>
+          <a:ext cx="12191999" cy="6858000"/>
         </p:xfrm>
         <a:graphic>
           <a:graphicData uri="http://schemas.openxmlformats.org/drawingml/2006/chart">

</xml_diff>